<commit_message>
add pptx node  modules insanity
</commit_message>
<xml_diff>
--- a/GC&memLeaks/demand-mem-leak.pptx
+++ b/GC&memLeaks/demand-mem-leak.pptx
@@ -5720,10 +5720,10 @@
   </p:clrMapOvr>
   <mc:AlternateContent xmlns:mc="http://schemas.openxmlformats.org/markup-compatibility/2006">
     <mc:Choice xmlns:p14="http://schemas.microsoft.com/office/powerpoint/2010/main" Requires="p14">
-      <p:transition p14:dur="0" advTm="0"/>
+      <p:transition p14:dur="0"/>
     </mc:Choice>
     <mc:Fallback>
-      <p:transition advTm="0"/>
+      <p:transition/>
     </mc:Fallback>
   </mc:AlternateContent>
 </p:sld>
@@ -5836,10 +5836,10 @@
   </p:clrMapOvr>
   <mc:AlternateContent xmlns:mc="http://schemas.openxmlformats.org/markup-compatibility/2006">
     <mc:Choice xmlns:p14="http://schemas.microsoft.com/office/powerpoint/2010/main" Requires="p14">
-      <p:transition p14:dur="0" advTm="4000"/>
+      <p:transition p14:dur="0"/>
     </mc:Choice>
     <mc:Fallback>
-      <p:transition advTm="4000"/>
+      <p:transition/>
     </mc:Fallback>
   </mc:AlternateContent>
 </p:sld>
@@ -6085,10 +6085,10 @@
   </p:clrMapOvr>
   <mc:AlternateContent xmlns:mc="http://schemas.openxmlformats.org/markup-compatibility/2006">
     <mc:Choice xmlns:p14="http://schemas.microsoft.com/office/powerpoint/2010/main" Requires="p14">
-      <p:transition p14:dur="0" advTm="4000"/>
+      <p:transition p14:dur="0"/>
     </mc:Choice>
     <mc:Fallback>
-      <p:transition advTm="4000"/>
+      <p:transition/>
     </mc:Fallback>
   </mc:AlternateContent>
 </p:sld>
@@ -6163,10 +6163,10 @@
   </p:clrMapOvr>
   <mc:AlternateContent xmlns:mc="http://schemas.openxmlformats.org/markup-compatibility/2006">
     <mc:Choice xmlns:p14="http://schemas.microsoft.com/office/powerpoint/2010/main" Requires="p14">
-      <p:transition p14:dur="0" advTm="4000"/>
+      <p:transition p14:dur="0"/>
     </mc:Choice>
     <mc:Fallback>
-      <p:transition advTm="4000"/>
+      <p:transition/>
     </mc:Fallback>
   </mc:AlternateContent>
 </p:sld>
@@ -6304,10 +6304,10 @@
   </p:clrMapOvr>
   <mc:AlternateContent xmlns:mc="http://schemas.openxmlformats.org/markup-compatibility/2006">
     <mc:Choice xmlns:p14="http://schemas.microsoft.com/office/powerpoint/2010/main" Requires="p14">
-      <p:transition p14:dur="0" advTm="4000"/>
+      <p:transition p14:dur="0"/>
     </mc:Choice>
     <mc:Fallback>
-      <p:transition advTm="4000"/>
+      <p:transition/>
     </mc:Fallback>
   </mc:AlternateContent>
 </p:sld>
@@ -6437,10 +6437,10 @@
   </p:clrMapOvr>
   <mc:AlternateContent xmlns:mc="http://schemas.openxmlformats.org/markup-compatibility/2006">
     <mc:Choice xmlns:p14="http://schemas.microsoft.com/office/powerpoint/2010/main" Requires="p14">
-      <p:transition p14:dur="0" advTm="4000"/>
+      <p:transition p14:dur="0"/>
     </mc:Choice>
     <mc:Fallback>
-      <p:transition advTm="4000"/>
+      <p:transition/>
     </mc:Fallback>
   </mc:AlternateContent>
 </p:sld>
@@ -6538,10 +6538,10 @@
   </p:clrMapOvr>
   <mc:AlternateContent xmlns:mc="http://schemas.openxmlformats.org/markup-compatibility/2006">
     <mc:Choice xmlns:p14="http://schemas.microsoft.com/office/powerpoint/2010/main" Requires="p14">
-      <p:transition p14:dur="0" advTm="4000"/>
+      <p:transition p14:dur="0"/>
     </mc:Choice>
     <mc:Fallback>
-      <p:transition advTm="4000"/>
+      <p:transition/>
     </mc:Fallback>
   </mc:AlternateContent>
 </p:sld>
@@ -6792,10 +6792,10 @@
   </p:clrMapOvr>
   <mc:AlternateContent xmlns:mc="http://schemas.openxmlformats.org/markup-compatibility/2006">
     <mc:Choice xmlns:p14="http://schemas.microsoft.com/office/powerpoint/2010/main" Requires="p14">
-      <p:transition p14:dur="0" advTm="4000"/>
+      <p:transition p14:dur="0"/>
     </mc:Choice>
     <mc:Fallback>
-      <p:transition advTm="4000"/>
+      <p:transition/>
     </mc:Fallback>
   </mc:AlternateContent>
 </p:sld>
@@ -7050,10 +7050,10 @@
   </p:clrMapOvr>
   <mc:AlternateContent xmlns:mc="http://schemas.openxmlformats.org/markup-compatibility/2006">
     <mc:Choice xmlns:p14="http://schemas.microsoft.com/office/powerpoint/2010/main" Requires="p14">
-      <p:transition p14:dur="0" advTm="4000"/>
+      <p:transition p14:dur="0"/>
     </mc:Choice>
     <mc:Fallback>
-      <p:transition advTm="4000"/>
+      <p:transition/>
     </mc:Fallback>
   </mc:AlternateContent>
 </p:sld>
@@ -7209,10 +7209,10 @@
   </p:clrMapOvr>
   <mc:AlternateContent xmlns:mc="http://schemas.openxmlformats.org/markup-compatibility/2006">
     <mc:Choice xmlns:p14="http://schemas.microsoft.com/office/powerpoint/2010/main" Requires="p14">
-      <p:transition p14:dur="0" advTm="4000"/>
+      <p:transition p14:dur="0"/>
     </mc:Choice>
     <mc:Fallback>
-      <p:transition advTm="4000"/>
+      <p:transition/>
     </mc:Fallback>
   </mc:AlternateContent>
 </p:sld>
@@ -7368,10 +7368,10 @@
   </p:clrMapOvr>
   <mc:AlternateContent xmlns:mc="http://schemas.openxmlformats.org/markup-compatibility/2006">
     <mc:Choice xmlns:p14="http://schemas.microsoft.com/office/powerpoint/2010/main" Requires="p14">
-      <p:transition p14:dur="0" advTm="4000"/>
+      <p:transition p14:dur="0"/>
     </mc:Choice>
     <mc:Fallback>
-      <p:transition advTm="4000"/>
+      <p:transition/>
     </mc:Fallback>
   </mc:AlternateContent>
 </p:sld>
@@ -7501,10 +7501,10 @@
   </p:clrMapOvr>
   <mc:AlternateContent xmlns:mc="http://schemas.openxmlformats.org/markup-compatibility/2006">
     <mc:Choice xmlns:p14="http://schemas.microsoft.com/office/powerpoint/2010/main" Requires="p14">
-      <p:transition p14:dur="0" advTm="4000"/>
+      <p:transition p14:dur="0"/>
     </mc:Choice>
     <mc:Fallback>
-      <p:transition advTm="4000"/>
+      <p:transition/>
     </mc:Fallback>
   </mc:AlternateContent>
 </p:sld>
@@ -7697,10 +7697,10 @@
   </p:clrMapOvr>
   <mc:AlternateContent xmlns:mc="http://schemas.openxmlformats.org/markup-compatibility/2006">
     <mc:Choice xmlns:p14="http://schemas.microsoft.com/office/powerpoint/2010/main" Requires="p14">
-      <p:transition p14:dur="0" advTm="4000"/>
+      <p:transition p14:dur="0"/>
     </mc:Choice>
     <mc:Fallback>
-      <p:transition advTm="4000"/>
+      <p:transition/>
     </mc:Fallback>
   </mc:AlternateContent>
 </p:sld>
@@ -7767,10 +7767,10 @@
   </p:clrMapOvr>
   <mc:AlternateContent xmlns:mc="http://schemas.openxmlformats.org/markup-compatibility/2006">
     <mc:Choice xmlns:p14="http://schemas.microsoft.com/office/powerpoint/2010/main" Requires="p14">
-      <p:transition p14:dur="0" advTm="4000"/>
+      <p:transition p14:dur="0"/>
     </mc:Choice>
     <mc:Fallback>
-      <p:transition advTm="4000"/>
+      <p:transition/>
     </mc:Fallback>
   </mc:AlternateContent>
 </p:sld>
@@ -7914,10 +7914,10 @@
   </p:clrMapOvr>
   <mc:AlternateContent xmlns:mc="http://schemas.openxmlformats.org/markup-compatibility/2006">
     <mc:Choice xmlns:p14="http://schemas.microsoft.com/office/powerpoint/2010/main" Requires="p14">
-      <p:transition p14:dur="0" advTm="4000"/>
+      <p:transition p14:dur="0"/>
     </mc:Choice>
     <mc:Fallback>
-      <p:transition advTm="4000"/>
+      <p:transition/>
     </mc:Fallback>
   </mc:AlternateContent>
 </p:sld>
@@ -8061,10 +8061,10 @@
   </p:clrMapOvr>
   <mc:AlternateContent xmlns:mc="http://schemas.openxmlformats.org/markup-compatibility/2006">
     <mc:Choice xmlns:p14="http://schemas.microsoft.com/office/powerpoint/2010/main" Requires="p14">
-      <p:transition p14:dur="0" advTm="4000"/>
+      <p:transition p14:dur="0"/>
     </mc:Choice>
     <mc:Fallback>
-      <p:transition advTm="4000"/>
+      <p:transition/>
     </mc:Fallback>
   </mc:AlternateContent>
 </p:sld>
@@ -8366,10 +8366,10 @@
   </p:clrMapOvr>
   <mc:AlternateContent xmlns:mc="http://schemas.openxmlformats.org/markup-compatibility/2006">
     <mc:Choice xmlns:p14="http://schemas.microsoft.com/office/powerpoint/2010/main" Requires="p14">
-      <p:transition p14:dur="0" advTm="4000"/>
+      <p:transition p14:dur="0"/>
     </mc:Choice>
     <mc:Fallback>
-      <p:transition advTm="4000"/>
+      <p:transition/>
     </mc:Fallback>
   </mc:AlternateContent>
 </p:sld>
@@ -8579,10 +8579,10 @@
   </p:clrMapOvr>
   <mc:AlternateContent xmlns:mc="http://schemas.openxmlformats.org/markup-compatibility/2006">
     <mc:Choice xmlns:p14="http://schemas.microsoft.com/office/powerpoint/2010/main" Requires="p14">
-      <p:transition p14:dur="0" advTm="4000"/>
+      <p:transition p14:dur="0"/>
     </mc:Choice>
     <mc:Fallback>
-      <p:transition advTm="4000"/>
+      <p:transition/>
     </mc:Fallback>
   </mc:AlternateContent>
 </p:sld>
@@ -8886,10 +8886,10 @@
   </p:clrMapOvr>
   <mc:AlternateContent xmlns:mc="http://schemas.openxmlformats.org/markup-compatibility/2006">
     <mc:Choice xmlns:p14="http://schemas.microsoft.com/office/powerpoint/2010/main" Requires="p14">
-      <p:transition p14:dur="0" advTm="4000"/>
+      <p:transition p14:dur="0"/>
     </mc:Choice>
     <mc:Fallback>
-      <p:transition advTm="4000"/>
+      <p:transition/>
     </mc:Fallback>
   </mc:AlternateContent>
 </p:sld>
@@ -9139,10 +9139,10 @@
   </p:clrMapOvr>
   <mc:AlternateContent xmlns:mc="http://schemas.openxmlformats.org/markup-compatibility/2006">
     <mc:Choice xmlns:p14="http://schemas.microsoft.com/office/powerpoint/2010/main" Requires="p14">
-      <p:transition p14:dur="0" advTm="4000"/>
+      <p:transition p14:dur="0"/>
     </mc:Choice>
     <mc:Fallback>
-      <p:transition advTm="4000"/>
+      <p:transition/>
     </mc:Fallback>
   </mc:AlternateContent>
 </p:sld>
@@ -9248,10 +9248,10 @@
   </p:clrMapOvr>
   <mc:AlternateContent xmlns:mc="http://schemas.openxmlformats.org/markup-compatibility/2006">
     <mc:Choice xmlns:p14="http://schemas.microsoft.com/office/powerpoint/2010/main" Requires="p14">
-      <p:transition p14:dur="0" advTm="4000"/>
+      <p:transition p14:dur="0"/>
     </mc:Choice>
     <mc:Fallback>
-      <p:transition advTm="4000"/>
+      <p:transition/>
     </mc:Fallback>
   </mc:AlternateContent>
 </p:sld>
@@ -9398,10 +9398,10 @@
   </p:clrMapOvr>
   <mc:AlternateContent xmlns:mc="http://schemas.openxmlformats.org/markup-compatibility/2006">
     <mc:Choice xmlns:p14="http://schemas.microsoft.com/office/powerpoint/2010/main" Requires="p14">
-      <p:transition p14:dur="0" advTm="4000"/>
+      <p:transition p14:dur="0"/>
     </mc:Choice>
     <mc:Fallback>
-      <p:transition advTm="4000"/>
+      <p:transition/>
     </mc:Fallback>
   </mc:AlternateContent>
 </p:sld>
@@ -9514,10 +9514,10 @@
   </p:clrMapOvr>
   <mc:AlternateContent xmlns:mc="http://schemas.openxmlformats.org/markup-compatibility/2006">
     <mc:Choice xmlns:p14="http://schemas.microsoft.com/office/powerpoint/2010/main" Requires="p14">
-      <p:transition p14:dur="0" advTm="4000"/>
+      <p:transition p14:dur="0"/>
     </mc:Choice>
     <mc:Fallback>
-      <p:transition advTm="4000"/>
+      <p:transition/>
     </mc:Fallback>
   </mc:AlternateContent>
 </p:sld>
@@ -9634,10 +9634,10 @@
   </p:clrMapOvr>
   <mc:AlternateContent xmlns:mc="http://schemas.openxmlformats.org/markup-compatibility/2006">
     <mc:Choice xmlns:p14="http://schemas.microsoft.com/office/powerpoint/2010/main" Requires="p14">
-      <p:transition p14:dur="0" advTm="4000"/>
+      <p:transition p14:dur="0"/>
     </mc:Choice>
     <mc:Fallback>
-      <p:transition advTm="4000"/>
+      <p:transition/>
     </mc:Fallback>
   </mc:AlternateContent>
 </p:sld>

</xml_diff>